<commit_message>
Added version control material
</commit_message>
<xml_diff>
--- a/1.Introduction/Introduction.pptx
+++ b/1.Introduction/Introduction.pptx
@@ -5,7 +5,7 @@
     <p:sldMasterId id="2147483661" r:id="rId1"/>
   </p:sldMasterIdLst>
   <p:notesMasterIdLst>
-    <p:notesMasterId r:id="rId15"/>
+    <p:notesMasterId r:id="rId14"/>
   </p:notesMasterIdLst>
   <p:sldIdLst>
     <p:sldId id="256" r:id="rId2"/>
@@ -15,29 +15,28 @@
     <p:sldId id="260" r:id="rId6"/>
     <p:sldId id="270" r:id="rId7"/>
     <p:sldId id="282" r:id="rId8"/>
-    <p:sldId id="273" r:id="rId9"/>
-    <p:sldId id="276" r:id="rId10"/>
-    <p:sldId id="277" r:id="rId11"/>
-    <p:sldId id="279" r:id="rId12"/>
-    <p:sldId id="281" r:id="rId13"/>
-    <p:sldId id="280" r:id="rId14"/>
+    <p:sldId id="276" r:id="rId9"/>
+    <p:sldId id="277" r:id="rId10"/>
+    <p:sldId id="279" r:id="rId11"/>
+    <p:sldId id="281" r:id="rId12"/>
+    <p:sldId id="280" r:id="rId13"/>
   </p:sldIdLst>
   <p:sldSz cx="9144000" cy="6858000" type="screen4x3"/>
   <p:notesSz cx="6858000" cy="9144000"/>
   <p:embeddedFontLst>
     <p:embeddedFont>
       <p:font typeface="Calibri" panose="020F0502020204030204" pitchFamily="34" charset="0"/>
-      <p:regular r:id="rId16"/>
-      <p:bold r:id="rId17"/>
-      <p:italic r:id="rId18"/>
-      <p:boldItalic r:id="rId19"/>
+      <p:regular r:id="rId15"/>
+      <p:bold r:id="rId16"/>
+      <p:italic r:id="rId17"/>
+      <p:boldItalic r:id="rId18"/>
     </p:embeddedFont>
     <p:embeddedFont>
       <p:font typeface="Roboto" panose="020B0604020202020204" charset="0"/>
-      <p:regular r:id="rId20"/>
-      <p:bold r:id="rId21"/>
-      <p:italic r:id="rId22"/>
-      <p:boldItalic r:id="rId23"/>
+      <p:regular r:id="rId19"/>
+      <p:bold r:id="rId20"/>
+      <p:italic r:id="rId21"/>
+      <p:boldItalic r:id="rId22"/>
     </p:embeddedFont>
   </p:embeddedFontLst>
   <p:defaultTextStyle>
@@ -1491,7 +1490,7 @@
   <p:cSld>
     <p:spTree>
       <p:nvGrpSpPr>
-        <p:cNvPr id="1" name="Shape 214"/>
+        <p:cNvPr id="1" name="Shape 164"/>
         <p:cNvGrpSpPr/>
         <p:nvPr/>
       </p:nvGrpSpPr>
@@ -1505,7 +1504,7 @@
       </p:grpSpPr>
       <p:sp>
         <p:nvSpPr>
-          <p:cNvPr id="215" name="Shape 215"/>
+          <p:cNvPr id="165" name="Shape 165"/>
           <p:cNvSpPr>
             <a:spLocks noGrp="1" noRot="1" noChangeAspect="1"/>
           </p:cNvSpPr>
@@ -1556,7 +1555,7 @@
       </p:sp>
       <p:sp>
         <p:nvSpPr>
-          <p:cNvPr id="216" name="Shape 216"/>
+          <p:cNvPr id="166" name="Shape 166"/>
           <p:cNvSpPr txBox="1">
             <a:spLocks noGrp="1"/>
           </p:cNvSpPr>
@@ -1602,30 +1601,7 @@
                 <a:cs typeface="Calibri"/>
                 <a:sym typeface="Calibri"/>
               </a:rPr>
-              <a:t>На этот слайд скорее всего и не посмотрим, все рассматриваем в коде.</a:t>
-            </a:r>
-            <a:br>
-              <a:rPr lang="ru-RU" sz="1200" b="0" i="0" u="none" strike="noStrike" cap="none" dirty="0">
-                <a:solidFill>
-                  <a:schemeClr val="dk1"/>
-                </a:solidFill>
-                <a:latin typeface="Calibri"/>
-                <a:ea typeface="Calibri"/>
-                <a:cs typeface="Calibri"/>
-                <a:sym typeface="Calibri"/>
-              </a:rPr>
-            </a:br>
-            <a:r>
-              <a:rPr lang="ru-RU" sz="1200" b="0" i="0" u="none" strike="noStrike" cap="none" dirty="0">
-                <a:solidFill>
-                  <a:schemeClr val="dk1"/>
-                </a:solidFill>
-                <a:latin typeface="Calibri"/>
-                <a:ea typeface="Calibri"/>
-                <a:cs typeface="Calibri"/>
-                <a:sym typeface="Calibri"/>
-              </a:rPr>
-              <a:t>Это как памятка.</a:t>
+              <a:t>Переходим в проект и смотрим файл проекта</a:t>
             </a:r>
             <a:endParaRPr sz="1200" b="0" i="0" u="none" strike="noStrike" cap="none" dirty="0">
               <a:solidFill>
@@ -1641,7 +1617,7 @@
       </p:sp>
       <p:sp>
         <p:nvSpPr>
-          <p:cNvPr id="217" name="Shape 217"/>
+          <p:cNvPr id="167" name="Shape 167"/>
           <p:cNvSpPr txBox="1">
             <a:spLocks noGrp="1"/>
           </p:cNvSpPr>
@@ -1704,7 +1680,7 @@
     </p:spTree>
     <p:extLst>
       <p:ext uri="{BB962C8B-B14F-4D97-AF65-F5344CB8AC3E}">
-        <p14:creationId xmlns:p14="http://schemas.microsoft.com/office/powerpoint/2010/main" val="2892780716"/>
+        <p14:creationId xmlns:p14="http://schemas.microsoft.com/office/powerpoint/2010/main" val="2165517973"/>
       </p:ext>
     </p:extLst>
   </p:cSld>
@@ -1715,6 +1691,211 @@
 </file>
 
 <file path=ppt/notesSlides/notesSlide11.xml><?xml version="1.0" encoding="utf-8"?>
+<p:notes xmlns:a="http://schemas.openxmlformats.org/drawingml/2006/main" xmlns:r="http://schemas.openxmlformats.org/officeDocument/2006/relationships" xmlns:p="http://schemas.openxmlformats.org/presentationml/2006/main" showMasterSp="0" showMasterPhAnim="0">
+  <p:cSld>
+    <p:spTree>
+      <p:nvGrpSpPr>
+        <p:cNvPr id="1" name="Shape 152"/>
+        <p:cNvGrpSpPr/>
+        <p:nvPr/>
+      </p:nvGrpSpPr>
+      <p:grpSpPr>
+        <a:xfrm>
+          <a:off x="0" y="0"/>
+          <a:ext cx="0" cy="0"/>
+          <a:chOff x="0" y="0"/>
+          <a:chExt cx="0" cy="0"/>
+        </a:xfrm>
+      </p:grpSpPr>
+      <p:sp>
+        <p:nvSpPr>
+          <p:cNvPr id="153" name="Shape 153"/>
+          <p:cNvSpPr>
+            <a:spLocks noGrp="1" noRot="1" noChangeAspect="1"/>
+          </p:cNvSpPr>
+          <p:nvPr>
+            <p:ph type="sldImg" idx="2"/>
+          </p:nvPr>
+        </p:nvSpPr>
+        <p:spPr>
+          <a:xfrm>
+            <a:off x="1143000" y="685800"/>
+            <a:ext cx="4572000" cy="3429000"/>
+          </a:xfrm>
+          <a:custGeom>
+            <a:avLst/>
+            <a:gdLst/>
+            <a:ahLst/>
+            <a:cxnLst/>
+            <a:rect l="0" t="0" r="0" b="0"/>
+            <a:pathLst>
+              <a:path w="120000" h="120000" extrusionOk="0">
+                <a:moveTo>
+                  <a:pt x="0" y="0"/>
+                </a:moveTo>
+                <a:lnTo>
+                  <a:pt x="120000" y="0"/>
+                </a:lnTo>
+                <a:lnTo>
+                  <a:pt x="120000" y="120000"/>
+                </a:lnTo>
+                <a:lnTo>
+                  <a:pt x="0" y="120000"/>
+                </a:lnTo>
+                <a:close/>
+              </a:path>
+            </a:pathLst>
+          </a:custGeom>
+          <a:noFill/>
+          <a:ln w="9525" cap="flat" cmpd="sng">
+            <a:solidFill>
+              <a:srgbClr val="000000"/>
+            </a:solidFill>
+            <a:prstDash val="solid"/>
+            <a:miter lim="800000"/>
+            <a:headEnd type="none" w="med" len="med"/>
+            <a:tailEnd type="none" w="med" len="med"/>
+          </a:ln>
+        </p:spPr>
+      </p:sp>
+      <p:sp>
+        <p:nvSpPr>
+          <p:cNvPr id="154" name="Shape 154"/>
+          <p:cNvSpPr txBox="1">
+            <a:spLocks noGrp="1"/>
+          </p:cNvSpPr>
+          <p:nvPr>
+            <p:ph type="body" idx="1"/>
+          </p:nvPr>
+        </p:nvSpPr>
+        <p:spPr>
+          <a:xfrm>
+            <a:off x="685800" y="4343400"/>
+            <a:ext cx="5486400" cy="4114800"/>
+          </a:xfrm>
+          <a:prstGeom prst="rect">
+            <a:avLst/>
+          </a:prstGeom>
+          <a:noFill/>
+          <a:ln>
+            <a:noFill/>
+          </a:ln>
+        </p:spPr>
+        <p:txBody>
+          <a:bodyPr spcFirstLastPara="1" wrap="square" lIns="91425" tIns="45700" rIns="91425" bIns="45700" anchor="t" anchorCtr="0">
+            <a:noAutofit/>
+          </a:bodyPr>
+          <a:lstStyle/>
+          <a:p>
+            <a:pPr marL="0" marR="0" lvl="0" indent="0" algn="l" rtl="0">
+              <a:spcBef>
+                <a:spcPts val="0"/>
+              </a:spcBef>
+              <a:spcAft>
+                <a:spcPts val="0"/>
+              </a:spcAft>
+              <a:buNone/>
+            </a:pPr>
+            <a:r>
+              <a:rPr lang="ru-RU" sz="1200" b="0" i="0" u="none" strike="noStrike" cap="none" dirty="0">
+                <a:solidFill>
+                  <a:schemeClr val="dk1"/>
+                </a:solidFill>
+                <a:latin typeface="Calibri"/>
+                <a:ea typeface="Calibri"/>
+                <a:cs typeface="Calibri"/>
+                <a:sym typeface="Calibri"/>
+              </a:rPr>
+              <a:t>Переходим в проект и рассматриваем стандартные метапакеты</a:t>
+            </a:r>
+            <a:endParaRPr sz="1200" b="0" i="0" u="none" strike="noStrike" cap="none" dirty="0">
+              <a:solidFill>
+                <a:schemeClr val="dk1"/>
+              </a:solidFill>
+              <a:latin typeface="Calibri"/>
+              <a:ea typeface="Calibri"/>
+              <a:cs typeface="Calibri"/>
+              <a:sym typeface="Calibri"/>
+            </a:endParaRPr>
+          </a:p>
+        </p:txBody>
+      </p:sp>
+      <p:sp>
+        <p:nvSpPr>
+          <p:cNvPr id="155" name="Shape 155"/>
+          <p:cNvSpPr txBox="1">
+            <a:spLocks noGrp="1"/>
+          </p:cNvSpPr>
+          <p:nvPr>
+            <p:ph type="sldNum" idx="12"/>
+          </p:nvPr>
+        </p:nvSpPr>
+        <p:spPr>
+          <a:xfrm>
+            <a:off x="3884613" y="8685213"/>
+            <a:ext cx="2971800" cy="457200"/>
+          </a:xfrm>
+          <a:prstGeom prst="rect">
+            <a:avLst/>
+          </a:prstGeom>
+          <a:noFill/>
+          <a:ln>
+            <a:noFill/>
+          </a:ln>
+        </p:spPr>
+        <p:txBody>
+          <a:bodyPr spcFirstLastPara="1" wrap="square" lIns="91425" tIns="45700" rIns="91425" bIns="45700" anchor="b" anchorCtr="0">
+            <a:noAutofit/>
+          </a:bodyPr>
+          <a:lstStyle/>
+          <a:p>
+            <a:pPr marL="0" marR="0" lvl="0" indent="0" algn="r" rtl="0">
+              <a:spcBef>
+                <a:spcPts val="0"/>
+              </a:spcBef>
+              <a:spcAft>
+                <a:spcPts val="0"/>
+              </a:spcAft>
+              <a:buNone/>
+            </a:pPr>
+            <a:fld id="{00000000-1234-1234-1234-123412341234}" type="slidenum">
+              <a:rPr lang="en-US" sz="1200" b="0" i="0" u="none" strike="noStrike" cap="none">
+                <a:solidFill>
+                  <a:schemeClr val="dk1"/>
+                </a:solidFill>
+                <a:latin typeface="Calibri"/>
+                <a:ea typeface="Calibri"/>
+                <a:cs typeface="Calibri"/>
+                <a:sym typeface="Calibri"/>
+              </a:rPr>
+              <a:t>11</a:t>
+            </a:fld>
+            <a:endParaRPr sz="1200" b="0" i="0" u="none" strike="noStrike" cap="none">
+              <a:solidFill>
+                <a:schemeClr val="dk1"/>
+              </a:solidFill>
+              <a:latin typeface="Calibri"/>
+              <a:ea typeface="Calibri"/>
+              <a:cs typeface="Calibri"/>
+              <a:sym typeface="Calibri"/>
+            </a:endParaRPr>
+          </a:p>
+        </p:txBody>
+      </p:sp>
+    </p:spTree>
+    <p:extLst>
+      <p:ext uri="{BB962C8B-B14F-4D97-AF65-F5344CB8AC3E}">
+        <p14:creationId xmlns:p14="http://schemas.microsoft.com/office/powerpoint/2010/main" val="1694727113"/>
+      </p:ext>
+    </p:extLst>
+  </p:cSld>
+  <p:clrMapOvr>
+    <a:masterClrMapping/>
+  </p:clrMapOvr>
+</p:notes>
+</file>
+
+<file path=ppt/notesSlides/notesSlide12.xml><?xml version="1.0" encoding="utf-8"?>
 <p:notes xmlns:a="http://schemas.openxmlformats.org/drawingml/2006/main" xmlns:r="http://schemas.openxmlformats.org/officeDocument/2006/relationships" xmlns:p="http://schemas.openxmlformats.org/presentationml/2006/main" showMasterSp="0" showMasterPhAnim="0">
   <p:cSld>
     <p:spTree>
@@ -1830,7 +2011,7 @@
                 <a:cs typeface="Calibri"/>
                 <a:sym typeface="Calibri"/>
               </a:rPr>
-              <a:t>Переходим в проект и смотрим файл проекта</a:t>
+              <a:t>Переходим в проект и смотрим файлы настроек</a:t>
             </a:r>
             <a:endParaRPr sz="1200" b="0" i="0" u="none" strike="noStrike" cap="none" dirty="0">
               <a:solidFill>
@@ -1892,417 +2073,7 @@
                 <a:cs typeface="Calibri"/>
                 <a:sym typeface="Calibri"/>
               </a:rPr>
-              <a:t>11</a:t>
-            </a:fld>
-            <a:endParaRPr sz="1200" b="0" i="0" u="none" strike="noStrike" cap="none">
-              <a:solidFill>
-                <a:schemeClr val="dk1"/>
-              </a:solidFill>
-              <a:latin typeface="Calibri"/>
-              <a:ea typeface="Calibri"/>
-              <a:cs typeface="Calibri"/>
-              <a:sym typeface="Calibri"/>
-            </a:endParaRPr>
-          </a:p>
-        </p:txBody>
-      </p:sp>
-    </p:spTree>
-    <p:extLst>
-      <p:ext uri="{BB962C8B-B14F-4D97-AF65-F5344CB8AC3E}">
-        <p14:creationId xmlns:p14="http://schemas.microsoft.com/office/powerpoint/2010/main" val="2165517973"/>
-      </p:ext>
-    </p:extLst>
-  </p:cSld>
-  <p:clrMapOvr>
-    <a:masterClrMapping/>
-  </p:clrMapOvr>
-</p:notes>
-</file>
-
-<file path=ppt/notesSlides/notesSlide12.xml><?xml version="1.0" encoding="utf-8"?>
-<p:notes xmlns:a="http://schemas.openxmlformats.org/drawingml/2006/main" xmlns:r="http://schemas.openxmlformats.org/officeDocument/2006/relationships" xmlns:p="http://schemas.openxmlformats.org/presentationml/2006/main" showMasterSp="0" showMasterPhAnim="0">
-  <p:cSld>
-    <p:spTree>
-      <p:nvGrpSpPr>
-        <p:cNvPr id="1" name="Shape 152"/>
-        <p:cNvGrpSpPr/>
-        <p:nvPr/>
-      </p:nvGrpSpPr>
-      <p:grpSpPr>
-        <a:xfrm>
-          <a:off x="0" y="0"/>
-          <a:ext cx="0" cy="0"/>
-          <a:chOff x="0" y="0"/>
-          <a:chExt cx="0" cy="0"/>
-        </a:xfrm>
-      </p:grpSpPr>
-      <p:sp>
-        <p:nvSpPr>
-          <p:cNvPr id="153" name="Shape 153"/>
-          <p:cNvSpPr>
-            <a:spLocks noGrp="1" noRot="1" noChangeAspect="1"/>
-          </p:cNvSpPr>
-          <p:nvPr>
-            <p:ph type="sldImg" idx="2"/>
-          </p:nvPr>
-        </p:nvSpPr>
-        <p:spPr>
-          <a:xfrm>
-            <a:off x="1143000" y="685800"/>
-            <a:ext cx="4572000" cy="3429000"/>
-          </a:xfrm>
-          <a:custGeom>
-            <a:avLst/>
-            <a:gdLst/>
-            <a:ahLst/>
-            <a:cxnLst/>
-            <a:rect l="0" t="0" r="0" b="0"/>
-            <a:pathLst>
-              <a:path w="120000" h="120000" extrusionOk="0">
-                <a:moveTo>
-                  <a:pt x="0" y="0"/>
-                </a:moveTo>
-                <a:lnTo>
-                  <a:pt x="120000" y="0"/>
-                </a:lnTo>
-                <a:lnTo>
-                  <a:pt x="120000" y="120000"/>
-                </a:lnTo>
-                <a:lnTo>
-                  <a:pt x="0" y="120000"/>
-                </a:lnTo>
-                <a:close/>
-              </a:path>
-            </a:pathLst>
-          </a:custGeom>
-          <a:noFill/>
-          <a:ln w="9525" cap="flat" cmpd="sng">
-            <a:solidFill>
-              <a:srgbClr val="000000"/>
-            </a:solidFill>
-            <a:prstDash val="solid"/>
-            <a:miter lim="800000"/>
-            <a:headEnd type="none" w="med" len="med"/>
-            <a:tailEnd type="none" w="med" len="med"/>
-          </a:ln>
-        </p:spPr>
-      </p:sp>
-      <p:sp>
-        <p:nvSpPr>
-          <p:cNvPr id="154" name="Shape 154"/>
-          <p:cNvSpPr txBox="1">
-            <a:spLocks noGrp="1"/>
-          </p:cNvSpPr>
-          <p:nvPr>
-            <p:ph type="body" idx="1"/>
-          </p:nvPr>
-        </p:nvSpPr>
-        <p:spPr>
-          <a:xfrm>
-            <a:off x="685800" y="4343400"/>
-            <a:ext cx="5486400" cy="4114800"/>
-          </a:xfrm>
-          <a:prstGeom prst="rect">
-            <a:avLst/>
-          </a:prstGeom>
-          <a:noFill/>
-          <a:ln>
-            <a:noFill/>
-          </a:ln>
-        </p:spPr>
-        <p:txBody>
-          <a:bodyPr spcFirstLastPara="1" wrap="square" lIns="91425" tIns="45700" rIns="91425" bIns="45700" anchor="t" anchorCtr="0">
-            <a:noAutofit/>
-          </a:bodyPr>
-          <a:lstStyle/>
-          <a:p>
-            <a:pPr marL="0" marR="0" lvl="0" indent="0" algn="l" rtl="0">
-              <a:spcBef>
-                <a:spcPts val="0"/>
-              </a:spcBef>
-              <a:spcAft>
-                <a:spcPts val="0"/>
-              </a:spcAft>
-              <a:buNone/>
-            </a:pPr>
-            <a:r>
-              <a:rPr lang="ru-RU" sz="1200" b="0" i="0" u="none" strike="noStrike" cap="none" dirty="0">
-                <a:solidFill>
-                  <a:schemeClr val="dk1"/>
-                </a:solidFill>
-                <a:latin typeface="Calibri"/>
-                <a:ea typeface="Calibri"/>
-                <a:cs typeface="Calibri"/>
-                <a:sym typeface="Calibri"/>
-              </a:rPr>
-              <a:t>Переходим в проект и рассматриваем стандартные метапакеты</a:t>
-            </a:r>
-            <a:endParaRPr sz="1200" b="0" i="0" u="none" strike="noStrike" cap="none" dirty="0">
-              <a:solidFill>
-                <a:schemeClr val="dk1"/>
-              </a:solidFill>
-              <a:latin typeface="Calibri"/>
-              <a:ea typeface="Calibri"/>
-              <a:cs typeface="Calibri"/>
-              <a:sym typeface="Calibri"/>
-            </a:endParaRPr>
-          </a:p>
-        </p:txBody>
-      </p:sp>
-      <p:sp>
-        <p:nvSpPr>
-          <p:cNvPr id="155" name="Shape 155"/>
-          <p:cNvSpPr txBox="1">
-            <a:spLocks noGrp="1"/>
-          </p:cNvSpPr>
-          <p:nvPr>
-            <p:ph type="sldNum" idx="12"/>
-          </p:nvPr>
-        </p:nvSpPr>
-        <p:spPr>
-          <a:xfrm>
-            <a:off x="3884613" y="8685213"/>
-            <a:ext cx="2971800" cy="457200"/>
-          </a:xfrm>
-          <a:prstGeom prst="rect">
-            <a:avLst/>
-          </a:prstGeom>
-          <a:noFill/>
-          <a:ln>
-            <a:noFill/>
-          </a:ln>
-        </p:spPr>
-        <p:txBody>
-          <a:bodyPr spcFirstLastPara="1" wrap="square" lIns="91425" tIns="45700" rIns="91425" bIns="45700" anchor="b" anchorCtr="0">
-            <a:noAutofit/>
-          </a:bodyPr>
-          <a:lstStyle/>
-          <a:p>
-            <a:pPr marL="0" marR="0" lvl="0" indent="0" algn="r" rtl="0">
-              <a:spcBef>
-                <a:spcPts val="0"/>
-              </a:spcBef>
-              <a:spcAft>
-                <a:spcPts val="0"/>
-              </a:spcAft>
-              <a:buNone/>
-            </a:pPr>
-            <a:fld id="{00000000-1234-1234-1234-123412341234}" type="slidenum">
-              <a:rPr lang="en-US" sz="1200" b="0" i="0" u="none" strike="noStrike" cap="none">
-                <a:solidFill>
-                  <a:schemeClr val="dk1"/>
-                </a:solidFill>
-                <a:latin typeface="Calibri"/>
-                <a:ea typeface="Calibri"/>
-                <a:cs typeface="Calibri"/>
-                <a:sym typeface="Calibri"/>
-              </a:rPr>
               <a:t>12</a:t>
-            </a:fld>
-            <a:endParaRPr sz="1200" b="0" i="0" u="none" strike="noStrike" cap="none">
-              <a:solidFill>
-                <a:schemeClr val="dk1"/>
-              </a:solidFill>
-              <a:latin typeface="Calibri"/>
-              <a:ea typeface="Calibri"/>
-              <a:cs typeface="Calibri"/>
-              <a:sym typeface="Calibri"/>
-            </a:endParaRPr>
-          </a:p>
-        </p:txBody>
-      </p:sp>
-    </p:spTree>
-    <p:extLst>
-      <p:ext uri="{BB962C8B-B14F-4D97-AF65-F5344CB8AC3E}">
-        <p14:creationId xmlns:p14="http://schemas.microsoft.com/office/powerpoint/2010/main" val="1694727113"/>
-      </p:ext>
-    </p:extLst>
-  </p:cSld>
-  <p:clrMapOvr>
-    <a:masterClrMapping/>
-  </p:clrMapOvr>
-</p:notes>
-</file>
-
-<file path=ppt/notesSlides/notesSlide13.xml><?xml version="1.0" encoding="utf-8"?>
-<p:notes xmlns:a="http://schemas.openxmlformats.org/drawingml/2006/main" xmlns:r="http://schemas.openxmlformats.org/officeDocument/2006/relationships" xmlns:p="http://schemas.openxmlformats.org/presentationml/2006/main" showMasterSp="0" showMasterPhAnim="0">
-  <p:cSld>
-    <p:spTree>
-      <p:nvGrpSpPr>
-        <p:cNvPr id="1" name="Shape 164"/>
-        <p:cNvGrpSpPr/>
-        <p:nvPr/>
-      </p:nvGrpSpPr>
-      <p:grpSpPr>
-        <a:xfrm>
-          <a:off x="0" y="0"/>
-          <a:ext cx="0" cy="0"/>
-          <a:chOff x="0" y="0"/>
-          <a:chExt cx="0" cy="0"/>
-        </a:xfrm>
-      </p:grpSpPr>
-      <p:sp>
-        <p:nvSpPr>
-          <p:cNvPr id="165" name="Shape 165"/>
-          <p:cNvSpPr>
-            <a:spLocks noGrp="1" noRot="1" noChangeAspect="1"/>
-          </p:cNvSpPr>
-          <p:nvPr>
-            <p:ph type="sldImg" idx="2"/>
-          </p:nvPr>
-        </p:nvSpPr>
-        <p:spPr>
-          <a:xfrm>
-            <a:off x="1143000" y="685800"/>
-            <a:ext cx="4572000" cy="3429000"/>
-          </a:xfrm>
-          <a:custGeom>
-            <a:avLst/>
-            <a:gdLst/>
-            <a:ahLst/>
-            <a:cxnLst/>
-            <a:rect l="0" t="0" r="0" b="0"/>
-            <a:pathLst>
-              <a:path w="120000" h="120000" extrusionOk="0">
-                <a:moveTo>
-                  <a:pt x="0" y="0"/>
-                </a:moveTo>
-                <a:lnTo>
-                  <a:pt x="120000" y="0"/>
-                </a:lnTo>
-                <a:lnTo>
-                  <a:pt x="120000" y="120000"/>
-                </a:lnTo>
-                <a:lnTo>
-                  <a:pt x="0" y="120000"/>
-                </a:lnTo>
-                <a:close/>
-              </a:path>
-            </a:pathLst>
-          </a:custGeom>
-          <a:noFill/>
-          <a:ln w="9525" cap="flat" cmpd="sng">
-            <a:solidFill>
-              <a:srgbClr val="000000"/>
-            </a:solidFill>
-            <a:prstDash val="solid"/>
-            <a:miter lim="800000"/>
-            <a:headEnd type="none" w="med" len="med"/>
-            <a:tailEnd type="none" w="med" len="med"/>
-          </a:ln>
-        </p:spPr>
-      </p:sp>
-      <p:sp>
-        <p:nvSpPr>
-          <p:cNvPr id="166" name="Shape 166"/>
-          <p:cNvSpPr txBox="1">
-            <a:spLocks noGrp="1"/>
-          </p:cNvSpPr>
-          <p:nvPr>
-            <p:ph type="body" idx="1"/>
-          </p:nvPr>
-        </p:nvSpPr>
-        <p:spPr>
-          <a:xfrm>
-            <a:off x="685800" y="4343400"/>
-            <a:ext cx="5486400" cy="4114800"/>
-          </a:xfrm>
-          <a:prstGeom prst="rect">
-            <a:avLst/>
-          </a:prstGeom>
-          <a:noFill/>
-          <a:ln>
-            <a:noFill/>
-          </a:ln>
-        </p:spPr>
-        <p:txBody>
-          <a:bodyPr spcFirstLastPara="1" wrap="square" lIns="91425" tIns="45700" rIns="91425" bIns="45700" anchor="t" anchorCtr="0">
-            <a:noAutofit/>
-          </a:bodyPr>
-          <a:lstStyle/>
-          <a:p>
-            <a:pPr marL="0" marR="0" lvl="0" indent="0" algn="l" rtl="0">
-              <a:spcBef>
-                <a:spcPts val="0"/>
-              </a:spcBef>
-              <a:spcAft>
-                <a:spcPts val="0"/>
-              </a:spcAft>
-              <a:buNone/>
-            </a:pPr>
-            <a:r>
-              <a:rPr lang="ru-RU" sz="1200" b="0" i="0" u="none" strike="noStrike" cap="none" dirty="0">
-                <a:solidFill>
-                  <a:schemeClr val="dk1"/>
-                </a:solidFill>
-                <a:latin typeface="Calibri"/>
-                <a:ea typeface="Calibri"/>
-                <a:cs typeface="Calibri"/>
-                <a:sym typeface="Calibri"/>
-              </a:rPr>
-              <a:t>Переходим в проект и смотрим файлы настроек</a:t>
-            </a:r>
-            <a:endParaRPr sz="1200" b="0" i="0" u="none" strike="noStrike" cap="none" dirty="0">
-              <a:solidFill>
-                <a:schemeClr val="dk1"/>
-              </a:solidFill>
-              <a:latin typeface="Calibri"/>
-              <a:ea typeface="Calibri"/>
-              <a:cs typeface="Calibri"/>
-              <a:sym typeface="Calibri"/>
-            </a:endParaRPr>
-          </a:p>
-        </p:txBody>
-      </p:sp>
-      <p:sp>
-        <p:nvSpPr>
-          <p:cNvPr id="167" name="Shape 167"/>
-          <p:cNvSpPr txBox="1">
-            <a:spLocks noGrp="1"/>
-          </p:cNvSpPr>
-          <p:nvPr>
-            <p:ph type="sldNum" idx="12"/>
-          </p:nvPr>
-        </p:nvSpPr>
-        <p:spPr>
-          <a:xfrm>
-            <a:off x="3884613" y="8685213"/>
-            <a:ext cx="2971800" cy="457200"/>
-          </a:xfrm>
-          <a:prstGeom prst="rect">
-            <a:avLst/>
-          </a:prstGeom>
-          <a:noFill/>
-          <a:ln>
-            <a:noFill/>
-          </a:ln>
-        </p:spPr>
-        <p:txBody>
-          <a:bodyPr spcFirstLastPara="1" wrap="square" lIns="91425" tIns="45700" rIns="91425" bIns="45700" anchor="b" anchorCtr="0">
-            <a:noAutofit/>
-          </a:bodyPr>
-          <a:lstStyle/>
-          <a:p>
-            <a:pPr marL="0" marR="0" lvl="0" indent="0" algn="r" rtl="0">
-              <a:spcBef>
-                <a:spcPts val="0"/>
-              </a:spcBef>
-              <a:spcAft>
-                <a:spcPts val="0"/>
-              </a:spcAft>
-              <a:buNone/>
-            </a:pPr>
-            <a:fld id="{00000000-1234-1234-1234-123412341234}" type="slidenum">
-              <a:rPr lang="en-US" sz="1200" b="0" i="0" u="none" strike="noStrike" cap="none">
-                <a:solidFill>
-                  <a:schemeClr val="dk1"/>
-                </a:solidFill>
-                <a:latin typeface="Calibri"/>
-                <a:ea typeface="Calibri"/>
-                <a:cs typeface="Calibri"/>
-                <a:sym typeface="Calibri"/>
-              </a:rPr>
-              <a:t>13</a:t>
             </a:fld>
             <a:endParaRPr sz="1200" b="0" i="0" u="none" strike="noStrike" cap="none">
               <a:solidFill>
@@ -3489,7 +3260,7 @@
   <p:cSld>
     <p:spTree>
       <p:nvGrpSpPr>
-        <p:cNvPr id="1" name="Shape 164"/>
+        <p:cNvPr id="1" name="Shape 214"/>
         <p:cNvGrpSpPr/>
         <p:nvPr/>
       </p:nvGrpSpPr>
@@ -3503,7 +3274,7 @@
       </p:grpSpPr>
       <p:sp>
         <p:nvSpPr>
-          <p:cNvPr id="165" name="Shape 165"/>
+          <p:cNvPr id="215" name="Shape 215"/>
           <p:cNvSpPr>
             <a:spLocks noGrp="1" noRot="1" noChangeAspect="1"/>
           </p:cNvSpPr>
@@ -3554,7 +3325,7 @@
       </p:sp>
       <p:sp>
         <p:nvSpPr>
-          <p:cNvPr id="166" name="Shape 166"/>
+          <p:cNvPr id="216" name="Shape 216"/>
           <p:cNvSpPr txBox="1">
             <a:spLocks noGrp="1"/>
           </p:cNvSpPr>
@@ -3600,113 +3371,7 @@
                 <a:cs typeface="Calibri"/>
                 <a:sym typeface="Calibri"/>
               </a:rPr>
-              <a:t>Открываем </a:t>
-            </a:r>
-            <a:r>
-              <a:rPr lang="en-US" sz="1200" b="0" i="0" u="none" strike="noStrike" cap="none" dirty="0">
-                <a:solidFill>
-                  <a:schemeClr val="dk1"/>
-                </a:solidFill>
-                <a:latin typeface="Calibri"/>
-                <a:ea typeface="Calibri"/>
-                <a:cs typeface="Calibri"/>
-                <a:sym typeface="Calibri"/>
-              </a:rPr>
-              <a:t>Visual Studio </a:t>
-            </a:r>
-            <a:r>
-              <a:rPr lang="ru-RU" sz="1200" b="0" i="0" u="none" strike="noStrike" cap="none" dirty="0">
-                <a:solidFill>
-                  <a:schemeClr val="dk1"/>
-                </a:solidFill>
-                <a:latin typeface="Calibri"/>
-                <a:ea typeface="Calibri"/>
-                <a:cs typeface="Calibri"/>
-                <a:sym typeface="Calibri"/>
-              </a:rPr>
-              <a:t>и смотрим воотчию на эти типы проектов.</a:t>
-            </a:r>
-            <a:br>
-              <a:rPr lang="en-US" sz="1200" b="0" i="0" u="none" strike="noStrike" cap="none" dirty="0">
-                <a:solidFill>
-                  <a:schemeClr val="dk1"/>
-                </a:solidFill>
-                <a:latin typeface="Calibri"/>
-                <a:ea typeface="Calibri"/>
-                <a:cs typeface="Calibri"/>
-                <a:sym typeface="Calibri"/>
-              </a:rPr>
-            </a:br>
-            <a:r>
-              <a:rPr lang="en-US" sz="1200" b="0" i="0" u="none" strike="noStrike" cap="none" dirty="0">
-                <a:solidFill>
-                  <a:schemeClr val="dk1"/>
-                </a:solidFill>
-                <a:latin typeface="Calibri"/>
-                <a:ea typeface="Calibri"/>
-                <a:cs typeface="Calibri"/>
-                <a:sym typeface="Calibri"/>
-              </a:rPr>
-              <a:t>C</a:t>
-            </a:r>
-            <a:r>
-              <a:rPr lang="ru-RU" sz="1200" b="0" i="0" u="none" strike="noStrike" cap="none" dirty="0">
-                <a:solidFill>
-                  <a:schemeClr val="dk1"/>
-                </a:solidFill>
-                <a:latin typeface="Calibri"/>
-                <a:ea typeface="Calibri"/>
-                <a:cs typeface="Calibri"/>
-                <a:sym typeface="Calibri"/>
-              </a:rPr>
-              <a:t>оздаем </a:t>
-            </a:r>
-            <a:r>
-              <a:rPr lang="en-US" sz="1200" b="0" i="0" u="none" strike="noStrike" cap="none" dirty="0">
-                <a:solidFill>
-                  <a:schemeClr val="dk1"/>
-                </a:solidFill>
-                <a:latin typeface="Calibri"/>
-                <a:ea typeface="Calibri"/>
-                <a:cs typeface="Calibri"/>
-                <a:sym typeface="Calibri"/>
-              </a:rPr>
-              <a:t>Empty project.</a:t>
-            </a:r>
-            <a:r>
-              <a:rPr lang="ru-RU" sz="1200" b="0" i="0" u="none" strike="noStrike" cap="none" dirty="0">
-                <a:solidFill>
-                  <a:schemeClr val="dk1"/>
-                </a:solidFill>
-                <a:latin typeface="Calibri"/>
-                <a:ea typeface="Calibri"/>
-                <a:cs typeface="Calibri"/>
-                <a:sym typeface="Calibri"/>
-              </a:rPr>
-              <a:t> </a:t>
-            </a:r>
-            <a:br>
-              <a:rPr lang="ru-RU" sz="1200" b="0" i="0" u="none" strike="noStrike" cap="none" dirty="0">
-                <a:solidFill>
-                  <a:schemeClr val="dk1"/>
-                </a:solidFill>
-                <a:latin typeface="Calibri"/>
-                <a:ea typeface="Calibri"/>
-                <a:cs typeface="Calibri"/>
-                <a:sym typeface="Calibri"/>
-              </a:rPr>
-            </a:br>
-            <a:r>
-              <a:rPr lang="uk-UA" sz="1200" b="0" i="0" u="none" strike="noStrike" cap="none" dirty="0">
-                <a:solidFill>
-                  <a:schemeClr val="dk1"/>
-                </a:solidFill>
-                <a:latin typeface="Calibri"/>
-                <a:ea typeface="Calibri"/>
-                <a:cs typeface="Calibri"/>
-                <a:sym typeface="Calibri"/>
-              </a:rPr>
-              <a:t>Запускаем, чтоб посмотреть как работает.</a:t>
+              <a:t>Сразу же переходим в код и рассматриваем класс там, а это будет как короткое напоминание.</a:t>
             </a:r>
             <a:endParaRPr sz="1200" b="0" i="0" u="none" strike="noStrike" cap="none" dirty="0">
               <a:solidFill>
@@ -3722,7 +3387,7 @@
       </p:sp>
       <p:sp>
         <p:nvSpPr>
-          <p:cNvPr id="167" name="Shape 167"/>
+          <p:cNvPr id="217" name="Shape 217"/>
           <p:cNvSpPr txBox="1">
             <a:spLocks noGrp="1"/>
           </p:cNvSpPr>
@@ -3785,7 +3450,7 @@
     </p:spTree>
     <p:extLst>
       <p:ext uri="{BB962C8B-B14F-4D97-AF65-F5344CB8AC3E}">
-        <p14:creationId xmlns:p14="http://schemas.microsoft.com/office/powerpoint/2010/main" val="3241518697"/>
+        <p14:creationId xmlns:p14="http://schemas.microsoft.com/office/powerpoint/2010/main" val="4134292241"/>
       </p:ext>
     </p:extLst>
   </p:cSld>
@@ -3911,7 +3576,30 @@
                 <a:cs typeface="Calibri"/>
                 <a:sym typeface="Calibri"/>
               </a:rPr>
-              <a:t>Сразу же переходим в код и рассматриваем класс там, а это будет как короткое напоминание.</a:t>
+              <a:t>На этот слайд скорее всего и не посмотрим, все рассматриваем в коде.</a:t>
+            </a:r>
+            <a:br>
+              <a:rPr lang="ru-RU" sz="1200" b="0" i="0" u="none" strike="noStrike" cap="none" dirty="0">
+                <a:solidFill>
+                  <a:schemeClr val="dk1"/>
+                </a:solidFill>
+                <a:latin typeface="Calibri"/>
+                <a:ea typeface="Calibri"/>
+                <a:cs typeface="Calibri"/>
+                <a:sym typeface="Calibri"/>
+              </a:rPr>
+            </a:br>
+            <a:r>
+              <a:rPr lang="ru-RU" sz="1200" b="0" i="0" u="none" strike="noStrike" cap="none" dirty="0">
+                <a:solidFill>
+                  <a:schemeClr val="dk1"/>
+                </a:solidFill>
+                <a:latin typeface="Calibri"/>
+                <a:ea typeface="Calibri"/>
+                <a:cs typeface="Calibri"/>
+                <a:sym typeface="Calibri"/>
+              </a:rPr>
+              <a:t>Это как памятка.</a:t>
             </a:r>
             <a:endParaRPr sz="1200" b="0" i="0" u="none" strike="noStrike" cap="none" dirty="0">
               <a:solidFill>
@@ -3990,7 +3678,7 @@
     </p:spTree>
     <p:extLst>
       <p:ext uri="{BB962C8B-B14F-4D97-AF65-F5344CB8AC3E}">
-        <p14:creationId xmlns:p14="http://schemas.microsoft.com/office/powerpoint/2010/main" val="4134292241"/>
+        <p14:creationId xmlns:p14="http://schemas.microsoft.com/office/powerpoint/2010/main" val="2892780716"/>
       </p:ext>
     </p:extLst>
   </p:cSld>
@@ -21143,713 +20831,6 @@
   <p:cSld>
     <p:spTree>
       <p:nvGrpSpPr>
-        <p:cNvPr id="1" name="Shape 218"/>
-        <p:cNvGrpSpPr/>
-        <p:nvPr/>
-      </p:nvGrpSpPr>
-      <p:grpSpPr>
-        <a:xfrm>
-          <a:off x="0" y="0"/>
-          <a:ext cx="0" cy="0"/>
-          <a:chOff x="0" y="0"/>
-          <a:chExt cx="0" cy="0"/>
-        </a:xfrm>
-      </p:grpSpPr>
-      <p:sp>
-        <p:nvSpPr>
-          <p:cNvPr id="220" name="Shape 220"/>
-          <p:cNvSpPr txBox="1">
-            <a:spLocks noGrp="1"/>
-          </p:cNvSpPr>
-          <p:nvPr>
-            <p:ph type="title"/>
-          </p:nvPr>
-        </p:nvSpPr>
-        <p:spPr>
-          <a:xfrm>
-            <a:off x="419900" y="1289063"/>
-            <a:ext cx="8190600" cy="1143000"/>
-          </a:xfrm>
-          <a:prstGeom prst="rect">
-            <a:avLst/>
-          </a:prstGeom>
-          <a:noFill/>
-          <a:ln>
-            <a:noFill/>
-          </a:ln>
-        </p:spPr>
-        <p:txBody>
-          <a:bodyPr spcFirstLastPara="1" wrap="square" lIns="91425" tIns="45700" rIns="91425" bIns="45700" anchor="ctr" anchorCtr="0">
-            <a:noAutofit/>
-          </a:bodyPr>
-          <a:lstStyle/>
-          <a:p>
-            <a:pPr lvl="0" algn="l"/>
-            <a:r>
-              <a:rPr lang="en-US" sz="4100" b="1" dirty="0" err="1">
-                <a:latin typeface="Roboto"/>
-                <a:ea typeface="Roboto"/>
-                <a:cs typeface="Roboto"/>
-                <a:sym typeface="Roboto"/>
-              </a:rPr>
-              <a:t>Startup.cs</a:t>
-            </a:r>
-            <a:endParaRPr sz="4100" b="1" i="0" u="none" strike="noStrike" cap="none" dirty="0">
-              <a:solidFill>
-                <a:schemeClr val="dk1"/>
-              </a:solidFill>
-              <a:latin typeface="Roboto"/>
-              <a:ea typeface="Roboto"/>
-              <a:cs typeface="Roboto"/>
-              <a:sym typeface="Roboto"/>
-            </a:endParaRPr>
-          </a:p>
-        </p:txBody>
-      </p:sp>
-      <p:sp>
-        <p:nvSpPr>
-          <p:cNvPr id="221" name="Shape 221"/>
-          <p:cNvSpPr/>
-          <p:nvPr/>
-        </p:nvSpPr>
-        <p:spPr>
-          <a:xfrm>
-            <a:off x="524675" y="2741687"/>
-            <a:ext cx="365400" cy="365400"/>
-          </a:xfrm>
-          <a:prstGeom prst="rect">
-            <a:avLst/>
-          </a:prstGeom>
-          <a:noFill/>
-          <a:ln w="19050" cap="flat" cmpd="sng">
-            <a:solidFill>
-              <a:srgbClr val="262626"/>
-            </a:solidFill>
-            <a:prstDash val="solid"/>
-            <a:round/>
-            <a:headEnd type="none" w="med" len="med"/>
-            <a:tailEnd type="none" w="med" len="med"/>
-          </a:ln>
-        </p:spPr>
-        <p:txBody>
-          <a:bodyPr spcFirstLastPara="1" wrap="square" lIns="91425" tIns="91425" rIns="91425" bIns="91425" anchor="ctr" anchorCtr="0">
-            <a:noAutofit/>
-          </a:bodyPr>
-          <a:lstStyle/>
-          <a:p>
-            <a:pPr marL="0" lvl="0" indent="0" algn="ctr">
-              <a:spcBef>
-                <a:spcPts val="0"/>
-              </a:spcBef>
-              <a:spcAft>
-                <a:spcPts val="0"/>
-              </a:spcAft>
-              <a:buNone/>
-            </a:pPr>
-            <a:r>
-              <a:rPr lang="en-US" b="1">
-                <a:latin typeface="Roboto"/>
-                <a:ea typeface="Roboto"/>
-                <a:cs typeface="Roboto"/>
-                <a:sym typeface="Roboto"/>
-              </a:rPr>
-              <a:t>1</a:t>
-            </a:r>
-            <a:endParaRPr b="1">
-              <a:latin typeface="Roboto"/>
-              <a:ea typeface="Roboto"/>
-              <a:cs typeface="Roboto"/>
-              <a:sym typeface="Roboto"/>
-            </a:endParaRPr>
-          </a:p>
-        </p:txBody>
-      </p:sp>
-      <p:sp>
-        <p:nvSpPr>
-          <p:cNvPr id="222" name="Shape 222"/>
-          <p:cNvSpPr/>
-          <p:nvPr/>
-        </p:nvSpPr>
-        <p:spPr>
-          <a:xfrm>
-            <a:off x="524675" y="3843548"/>
-            <a:ext cx="365400" cy="365400"/>
-          </a:xfrm>
-          <a:prstGeom prst="rect">
-            <a:avLst/>
-          </a:prstGeom>
-          <a:noFill/>
-          <a:ln w="19050" cap="flat" cmpd="sng">
-            <a:solidFill>
-              <a:srgbClr val="CC0000"/>
-            </a:solidFill>
-            <a:prstDash val="solid"/>
-            <a:round/>
-            <a:headEnd type="none" w="med" len="med"/>
-            <a:tailEnd type="none" w="med" len="med"/>
-          </a:ln>
-        </p:spPr>
-        <p:txBody>
-          <a:bodyPr spcFirstLastPara="1" wrap="square" lIns="91425" tIns="91425" rIns="91425" bIns="91425" anchor="ctr" anchorCtr="0">
-            <a:noAutofit/>
-          </a:bodyPr>
-          <a:lstStyle/>
-          <a:p>
-            <a:pPr marL="0" lvl="0" indent="0" algn="ctr">
-              <a:spcBef>
-                <a:spcPts val="0"/>
-              </a:spcBef>
-              <a:spcAft>
-                <a:spcPts val="0"/>
-              </a:spcAft>
-              <a:buNone/>
-            </a:pPr>
-            <a:r>
-              <a:rPr lang="en-US" b="1">
-                <a:solidFill>
-                  <a:srgbClr val="CC0000"/>
-                </a:solidFill>
-                <a:latin typeface="Roboto"/>
-                <a:ea typeface="Roboto"/>
-                <a:cs typeface="Roboto"/>
-                <a:sym typeface="Roboto"/>
-              </a:rPr>
-              <a:t>2</a:t>
-            </a:r>
-            <a:endParaRPr b="1">
-              <a:solidFill>
-                <a:srgbClr val="CC0000"/>
-              </a:solidFill>
-              <a:latin typeface="Roboto"/>
-              <a:ea typeface="Roboto"/>
-              <a:cs typeface="Roboto"/>
-              <a:sym typeface="Roboto"/>
-            </a:endParaRPr>
-          </a:p>
-        </p:txBody>
-      </p:sp>
-      <p:sp>
-        <p:nvSpPr>
-          <p:cNvPr id="223" name="Shape 223"/>
-          <p:cNvSpPr/>
-          <p:nvPr/>
-        </p:nvSpPr>
-        <p:spPr>
-          <a:xfrm>
-            <a:off x="524675" y="4954079"/>
-            <a:ext cx="365400" cy="365400"/>
-          </a:xfrm>
-          <a:prstGeom prst="rect">
-            <a:avLst/>
-          </a:prstGeom>
-          <a:noFill/>
-          <a:ln w="19050" cap="flat" cmpd="sng">
-            <a:solidFill>
-              <a:srgbClr val="262626"/>
-            </a:solidFill>
-            <a:prstDash val="solid"/>
-            <a:round/>
-            <a:headEnd type="none" w="med" len="med"/>
-            <a:tailEnd type="none" w="med" len="med"/>
-          </a:ln>
-        </p:spPr>
-        <p:txBody>
-          <a:bodyPr spcFirstLastPara="1" wrap="square" lIns="91425" tIns="91425" rIns="91425" bIns="91425" anchor="ctr" anchorCtr="0">
-            <a:noAutofit/>
-          </a:bodyPr>
-          <a:lstStyle/>
-          <a:p>
-            <a:pPr marL="0" lvl="0" indent="0" algn="ctr">
-              <a:spcBef>
-                <a:spcPts val="0"/>
-              </a:spcBef>
-              <a:spcAft>
-                <a:spcPts val="0"/>
-              </a:spcAft>
-              <a:buNone/>
-            </a:pPr>
-            <a:r>
-              <a:rPr lang="en-US" b="1">
-                <a:latin typeface="Roboto"/>
-                <a:ea typeface="Roboto"/>
-                <a:cs typeface="Roboto"/>
-                <a:sym typeface="Roboto"/>
-              </a:rPr>
-              <a:t>3</a:t>
-            </a:r>
-            <a:endParaRPr b="1">
-              <a:latin typeface="Roboto"/>
-              <a:ea typeface="Roboto"/>
-              <a:cs typeface="Roboto"/>
-              <a:sym typeface="Roboto"/>
-            </a:endParaRPr>
-          </a:p>
-        </p:txBody>
-      </p:sp>
-      <p:sp>
-        <p:nvSpPr>
-          <p:cNvPr id="224" name="Shape 224"/>
-          <p:cNvSpPr txBox="1"/>
-          <p:nvPr/>
-        </p:nvSpPr>
-        <p:spPr>
-          <a:xfrm>
-            <a:off x="1165523" y="3522248"/>
-            <a:ext cx="6840900" cy="1008000"/>
-          </a:xfrm>
-          <a:prstGeom prst="rect">
-            <a:avLst/>
-          </a:prstGeom>
-          <a:noFill/>
-          <a:ln>
-            <a:noFill/>
-          </a:ln>
-        </p:spPr>
-        <p:txBody>
-          <a:bodyPr spcFirstLastPara="1" wrap="square" lIns="91425" tIns="45700" rIns="91425" bIns="45700" anchor="ctr" anchorCtr="0">
-            <a:noAutofit/>
-          </a:bodyPr>
-          <a:lstStyle/>
-          <a:p>
-            <a:pPr lvl="0"/>
-            <a:r>
-              <a:rPr lang="ru-RU" sz="2000" dirty="0">
-                <a:solidFill>
-                  <a:schemeClr val="tx1"/>
-                </a:solidFill>
-                <a:latin typeface="Roboto"/>
-                <a:ea typeface="Roboto"/>
-                <a:cs typeface="Roboto"/>
-                <a:sym typeface="Roboto"/>
-              </a:rPr>
-              <a:t>В методе </a:t>
-            </a:r>
-            <a:r>
-              <a:rPr lang="en-US" sz="2000" dirty="0" err="1">
-                <a:solidFill>
-                  <a:schemeClr val="tx1"/>
-                </a:solidFill>
-                <a:latin typeface="Roboto"/>
-                <a:ea typeface="Roboto"/>
-              </a:rPr>
-              <a:t>ConfigureServices</a:t>
-            </a:r>
-            <a:r>
-              <a:rPr lang="ru-RU" sz="2000" dirty="0">
-                <a:solidFill>
-                  <a:schemeClr val="tx1"/>
-                </a:solidFill>
-                <a:latin typeface="Roboto"/>
-                <a:ea typeface="Roboto"/>
-              </a:rPr>
-              <a:t> описывается конфигурация сервисов используемых веб приложением.</a:t>
-            </a:r>
-            <a:endParaRPr lang="ru-RU" sz="2000" dirty="0">
-              <a:solidFill>
-                <a:schemeClr val="tx1"/>
-              </a:solidFill>
-              <a:latin typeface="Roboto"/>
-              <a:ea typeface="Roboto"/>
-              <a:sym typeface="Roboto"/>
-            </a:endParaRPr>
-          </a:p>
-        </p:txBody>
-      </p:sp>
-      <p:sp>
-        <p:nvSpPr>
-          <p:cNvPr id="225" name="Shape 225"/>
-          <p:cNvSpPr txBox="1"/>
-          <p:nvPr/>
-        </p:nvSpPr>
-        <p:spPr>
-          <a:xfrm>
-            <a:off x="1165523" y="4632779"/>
-            <a:ext cx="6840900" cy="1008000"/>
-          </a:xfrm>
-          <a:prstGeom prst="rect">
-            <a:avLst/>
-          </a:prstGeom>
-          <a:noFill/>
-          <a:ln>
-            <a:noFill/>
-          </a:ln>
-        </p:spPr>
-        <p:txBody>
-          <a:bodyPr spcFirstLastPara="1" wrap="square" lIns="91425" tIns="45700" rIns="91425" bIns="45700" anchor="ctr" anchorCtr="0">
-            <a:noAutofit/>
-          </a:bodyPr>
-          <a:lstStyle/>
-          <a:p>
-            <a:pPr lvl="0">
-              <a:buClr>
-                <a:srgbClr val="262626"/>
-              </a:buClr>
-              <a:buSzPts val="2000"/>
-            </a:pPr>
-            <a:r>
-              <a:rPr lang="ru-RU" sz="2000" i="0" u="none" strike="noStrike" cap="none" dirty="0">
-                <a:solidFill>
-                  <a:srgbClr val="262626"/>
-                </a:solidFill>
-                <a:latin typeface="Roboto"/>
-                <a:ea typeface="Roboto"/>
-                <a:cs typeface="Roboto"/>
-                <a:sym typeface="Roboto"/>
-              </a:rPr>
-              <a:t>В метода </a:t>
-            </a:r>
-            <a:r>
-              <a:rPr lang="en-US" sz="2000" i="0" u="none" strike="noStrike" cap="none" dirty="0">
-                <a:solidFill>
-                  <a:srgbClr val="262626"/>
-                </a:solidFill>
-                <a:latin typeface="Roboto"/>
-                <a:ea typeface="Roboto"/>
-                <a:cs typeface="Roboto"/>
-                <a:sym typeface="Roboto"/>
-              </a:rPr>
-              <a:t>Configure </a:t>
-            </a:r>
-            <a:r>
-              <a:rPr lang="ru-RU" sz="2000" i="0" u="none" strike="noStrike" cap="none" dirty="0">
-                <a:solidFill>
-                  <a:srgbClr val="262626"/>
-                </a:solidFill>
-                <a:latin typeface="Roboto"/>
-                <a:ea typeface="Roboto"/>
-                <a:cs typeface="Roboto"/>
-                <a:sym typeface="Roboto"/>
-              </a:rPr>
-              <a:t>описывается цепь обработки </a:t>
-            </a:r>
-            <a:r>
-              <a:rPr lang="ru-RU" sz="2000" dirty="0">
-                <a:solidFill>
-                  <a:srgbClr val="262626"/>
-                </a:solidFill>
-                <a:latin typeface="Roboto"/>
-                <a:ea typeface="Roboto"/>
-                <a:cs typeface="Roboto"/>
-                <a:sym typeface="Roboto"/>
-              </a:rPr>
-              <a:t>веб </a:t>
-            </a:r>
-            <a:r>
-              <a:rPr lang="en-US" sz="2000" dirty="0">
-                <a:solidFill>
-                  <a:srgbClr val="262626"/>
-                </a:solidFill>
-                <a:latin typeface="Roboto"/>
-                <a:ea typeface="Roboto"/>
-                <a:cs typeface="Roboto"/>
-                <a:sym typeface="Roboto"/>
-              </a:rPr>
-              <a:t> </a:t>
-            </a:r>
-            <a:r>
-              <a:rPr lang="ru-RU" sz="2000" dirty="0">
-                <a:solidFill>
-                  <a:srgbClr val="262626"/>
-                </a:solidFill>
-                <a:latin typeface="Roboto"/>
-                <a:ea typeface="Roboto"/>
-                <a:cs typeface="Roboto"/>
-                <a:sym typeface="Roboto"/>
-              </a:rPr>
-              <a:t>запросов</a:t>
-            </a:r>
-            <a:endParaRPr sz="2000" i="0" u="none" strike="noStrike" cap="none" dirty="0">
-              <a:solidFill>
-                <a:srgbClr val="A5A5A5"/>
-              </a:solidFill>
-              <a:latin typeface="Roboto"/>
-              <a:ea typeface="Roboto"/>
-              <a:cs typeface="Roboto"/>
-              <a:sym typeface="Roboto"/>
-            </a:endParaRPr>
-          </a:p>
-        </p:txBody>
-      </p:sp>
-      <p:sp>
-        <p:nvSpPr>
-          <p:cNvPr id="226" name="Shape 226"/>
-          <p:cNvSpPr txBox="1"/>
-          <p:nvPr/>
-        </p:nvSpPr>
-        <p:spPr>
-          <a:xfrm>
-            <a:off x="1165523" y="2418137"/>
-            <a:ext cx="6840900" cy="1012500"/>
-          </a:xfrm>
-          <a:prstGeom prst="rect">
-            <a:avLst/>
-          </a:prstGeom>
-          <a:noFill/>
-          <a:ln>
-            <a:noFill/>
-          </a:ln>
-        </p:spPr>
-        <p:txBody>
-          <a:bodyPr spcFirstLastPara="1" wrap="square" lIns="91425" tIns="45700" rIns="91425" bIns="45700" anchor="ctr" anchorCtr="0">
-            <a:noAutofit/>
-          </a:bodyPr>
-          <a:lstStyle/>
-          <a:p>
-            <a:pPr lvl="0">
-              <a:lnSpc>
-                <a:spcPct val="110000"/>
-              </a:lnSpc>
-              <a:buClr>
-                <a:srgbClr val="F60046"/>
-              </a:buClr>
-              <a:buSzPts val="2000"/>
-            </a:pPr>
-            <a:r>
-              <a:rPr lang="ru-RU" sz="2000" dirty="0">
-                <a:solidFill>
-                  <a:schemeClr val="tx1"/>
-                </a:solidFill>
-                <a:latin typeface="Roboto"/>
-                <a:ea typeface="Roboto"/>
-                <a:cs typeface="Roboto"/>
-                <a:sym typeface="Roboto"/>
-              </a:rPr>
-              <a:t>В шаблоне </a:t>
-            </a:r>
-            <a:r>
-              <a:rPr lang="en-US" sz="2000" dirty="0">
-                <a:solidFill>
-                  <a:schemeClr val="tx1"/>
-                </a:solidFill>
-                <a:latin typeface="Roboto"/>
-                <a:ea typeface="Roboto"/>
-                <a:cs typeface="Roboto"/>
-                <a:sym typeface="Roboto"/>
-              </a:rPr>
-              <a:t>Empty project</a:t>
-            </a:r>
-            <a:r>
-              <a:rPr lang="ru-RU" sz="2000" dirty="0">
-                <a:solidFill>
-                  <a:schemeClr val="tx1"/>
-                </a:solidFill>
-                <a:latin typeface="Roboto"/>
-                <a:ea typeface="Roboto"/>
-                <a:cs typeface="Roboto"/>
-                <a:sym typeface="Roboto"/>
-              </a:rPr>
-              <a:t> класс </a:t>
-            </a:r>
-            <a:r>
-              <a:rPr lang="en-US" sz="2000" dirty="0" err="1">
-                <a:solidFill>
-                  <a:schemeClr val="tx1"/>
-                </a:solidFill>
-                <a:latin typeface="Roboto"/>
-                <a:ea typeface="Roboto"/>
-                <a:cs typeface="Roboto"/>
-                <a:sym typeface="Roboto"/>
-              </a:rPr>
-              <a:t>Startup.cs</a:t>
-            </a:r>
-            <a:r>
-              <a:rPr lang="en-US" sz="2000" dirty="0">
-                <a:solidFill>
-                  <a:schemeClr val="tx1"/>
-                </a:solidFill>
-                <a:latin typeface="Roboto"/>
-                <a:ea typeface="Roboto"/>
-                <a:cs typeface="Roboto"/>
-                <a:sym typeface="Roboto"/>
-              </a:rPr>
-              <a:t> </a:t>
-            </a:r>
-            <a:r>
-              <a:rPr lang="ru-RU" sz="2000" dirty="0">
-                <a:solidFill>
-                  <a:schemeClr val="tx1"/>
-                </a:solidFill>
-                <a:latin typeface="Roboto"/>
-                <a:ea typeface="Roboto"/>
-                <a:cs typeface="Roboto"/>
-                <a:sym typeface="Roboto"/>
-              </a:rPr>
-              <a:t>содержит два метода </a:t>
-            </a:r>
-            <a:r>
-              <a:rPr lang="en-US" sz="2000" dirty="0" err="1">
-                <a:solidFill>
-                  <a:schemeClr val="tx1"/>
-                </a:solidFill>
-                <a:latin typeface="Roboto"/>
-                <a:ea typeface="Roboto"/>
-                <a:cs typeface="Roboto"/>
-                <a:sym typeface="Roboto"/>
-              </a:rPr>
-              <a:t>ConfigureServices</a:t>
-            </a:r>
-            <a:r>
-              <a:rPr lang="en-US" sz="2000" dirty="0">
-                <a:solidFill>
-                  <a:schemeClr val="tx1"/>
-                </a:solidFill>
-                <a:latin typeface="Roboto"/>
-                <a:ea typeface="Roboto"/>
-                <a:cs typeface="Roboto"/>
-                <a:sym typeface="Roboto"/>
-              </a:rPr>
-              <a:t> </a:t>
-            </a:r>
-            <a:r>
-              <a:rPr lang="ru-RU" sz="2000" dirty="0">
-                <a:solidFill>
-                  <a:schemeClr val="tx1"/>
-                </a:solidFill>
-                <a:latin typeface="Roboto"/>
-                <a:ea typeface="Roboto"/>
-                <a:cs typeface="Roboto"/>
-                <a:sym typeface="Roboto"/>
-              </a:rPr>
-              <a:t>и </a:t>
-            </a:r>
-            <a:r>
-              <a:rPr lang="en-US" sz="2000" dirty="0">
-                <a:solidFill>
-                  <a:schemeClr val="tx1"/>
-                </a:solidFill>
-                <a:latin typeface="Roboto"/>
-                <a:ea typeface="Roboto"/>
-                <a:cs typeface="Roboto"/>
-                <a:sym typeface="Roboto"/>
-              </a:rPr>
-              <a:t>Configure</a:t>
-            </a:r>
-            <a:endParaRPr lang="ru-RU" sz="2000" dirty="0">
-              <a:solidFill>
-                <a:schemeClr val="tx1"/>
-              </a:solidFill>
-              <a:latin typeface="Roboto"/>
-              <a:ea typeface="Roboto"/>
-              <a:cs typeface="Roboto"/>
-              <a:sym typeface="Roboto"/>
-            </a:endParaRPr>
-          </a:p>
-        </p:txBody>
-      </p:sp>
-      <p:pic>
-        <p:nvPicPr>
-          <p:cNvPr id="227" name="Shape 227"/>
-          <p:cNvPicPr preferRelativeResize="0"/>
-          <p:nvPr/>
-        </p:nvPicPr>
-        <p:blipFill>
-          <a:blip r:embed="rId3">
-            <a:alphaModFix/>
-          </a:blip>
-          <a:stretch>
-            <a:fillRect/>
-          </a:stretch>
-        </p:blipFill>
-        <p:spPr>
-          <a:xfrm>
-            <a:off x="353700" y="302000"/>
-            <a:ext cx="1741800" cy="502875"/>
-          </a:xfrm>
-          <a:prstGeom prst="rect">
-            <a:avLst/>
-          </a:prstGeom>
-          <a:noFill/>
-          <a:ln>
-            <a:noFill/>
-          </a:ln>
-        </p:spPr>
-      </p:pic>
-      <p:sp>
-        <p:nvSpPr>
-          <p:cNvPr id="228" name="Shape 228"/>
-          <p:cNvSpPr/>
-          <p:nvPr/>
-        </p:nvSpPr>
-        <p:spPr>
-          <a:xfrm>
-            <a:off x="7145316" y="408237"/>
-            <a:ext cx="1856100" cy="290400"/>
-          </a:xfrm>
-          <a:prstGeom prst="roundRect">
-            <a:avLst>
-              <a:gd name="adj" fmla="val 0"/>
-            </a:avLst>
-          </a:prstGeom>
-          <a:noFill/>
-          <a:ln>
-            <a:noFill/>
-          </a:ln>
-        </p:spPr>
-        <p:txBody>
-          <a:bodyPr spcFirstLastPara="1" wrap="square" lIns="91425" tIns="45700" rIns="91425" bIns="45700" anchor="ctr" anchorCtr="0">
-            <a:noAutofit/>
-          </a:bodyPr>
-          <a:lstStyle/>
-          <a:p>
-            <a:pPr marL="0" marR="0" lvl="0" indent="0" algn="ctr" rtl="0">
-              <a:spcBef>
-                <a:spcPts val="0"/>
-              </a:spcBef>
-              <a:spcAft>
-                <a:spcPts val="0"/>
-              </a:spcAft>
-              <a:buClr>
-                <a:schemeClr val="lt1"/>
-              </a:buClr>
-              <a:buSzPts val="1200"/>
-              <a:buFont typeface="Arial"/>
-              <a:buNone/>
-            </a:pPr>
-            <a:r>
-              <a:rPr lang="en-US" sz="1500" b="1" i="0" strike="noStrike" cap="none">
-                <a:solidFill>
-                  <a:srgbClr val="262626"/>
-                </a:solidFill>
-                <a:latin typeface="Roboto"/>
-                <a:ea typeface="Roboto"/>
-                <a:cs typeface="Roboto"/>
-                <a:sym typeface="Roboto"/>
-              </a:rPr>
-              <a:t>www.itea.ua</a:t>
-            </a:r>
-            <a:endParaRPr sz="1500" b="1" i="0" strike="noStrike" cap="none">
-              <a:solidFill>
-                <a:srgbClr val="262626"/>
-              </a:solidFill>
-              <a:latin typeface="Roboto"/>
-              <a:ea typeface="Roboto"/>
-              <a:cs typeface="Roboto"/>
-              <a:sym typeface="Roboto"/>
-            </a:endParaRPr>
-          </a:p>
-        </p:txBody>
-      </p:sp>
-    </p:spTree>
-    <p:extLst>
-      <p:ext uri="{BB962C8B-B14F-4D97-AF65-F5344CB8AC3E}">
-        <p14:creationId xmlns:p14="http://schemas.microsoft.com/office/powerpoint/2010/main" val="184029711"/>
-      </p:ext>
-    </p:extLst>
-  </p:cSld>
-  <p:clrMapOvr>
-    <a:masterClrMapping/>
-  </p:clrMapOvr>
-  <p:transition>
-    <p:fade/>
-  </p:transition>
-</p:sld>
-</file>
-
-<file path=ppt/slides/slide11.xml><?xml version="1.0" encoding="utf-8"?>
-<p:sld xmlns:a="http://schemas.openxmlformats.org/drawingml/2006/main" xmlns:r="http://schemas.openxmlformats.org/officeDocument/2006/relationships" xmlns:p="http://schemas.openxmlformats.org/presentationml/2006/main">
-  <p:cSld>
-    <p:spTree>
-      <p:nvGrpSpPr>
         <p:cNvPr id="1" name="Shape 168"/>
         <p:cNvGrpSpPr/>
         <p:nvPr/>
@@ -22538,7 +21519,7 @@
 </p:sld>
 </file>
 
-<file path=ppt/slides/slide12.xml><?xml version="1.0" encoding="utf-8"?>
+<file path=ppt/slides/slide11.xml><?xml version="1.0" encoding="utf-8"?>
 <p:sld xmlns:a="http://schemas.openxmlformats.org/drawingml/2006/main" xmlns:r="http://schemas.openxmlformats.org/officeDocument/2006/relationships" xmlns:p="http://schemas.openxmlformats.org/presentationml/2006/main">
   <p:cSld>
     <p:spTree>
@@ -23179,7 +22160,7 @@
 </p:sld>
 </file>
 
-<file path=ppt/slides/slide13.xml><?xml version="1.0" encoding="utf-8"?>
+<file path=ppt/slides/slide12.xml><?xml version="1.0" encoding="utf-8"?>
 <p:sld xmlns:a="http://schemas.openxmlformats.org/drawingml/2006/main" xmlns:r="http://schemas.openxmlformats.org/officeDocument/2006/relationships" xmlns:p="http://schemas.openxmlformats.org/presentationml/2006/main">
   <p:cSld>
     <p:spTree>
@@ -27087,11 +26068,11 @@
 </file>
 
 <file path=ppt/slides/slide8.xml><?xml version="1.0" encoding="utf-8"?>
-<p:sld xmlns:a="http://schemas.openxmlformats.org/drawingml/2006/main" xmlns:r="http://schemas.openxmlformats.org/officeDocument/2006/relationships" xmlns:p="http://schemas.openxmlformats.org/presentationml/2006/main" show="0">
+<p:sld xmlns:a="http://schemas.openxmlformats.org/drawingml/2006/main" xmlns:r="http://schemas.openxmlformats.org/officeDocument/2006/relationships" xmlns:p="http://schemas.openxmlformats.org/presentationml/2006/main">
   <p:cSld>
     <p:spTree>
       <p:nvGrpSpPr>
-        <p:cNvPr id="1" name="Shape 168"/>
+        <p:cNvPr id="1" name="Shape 218"/>
         <p:cNvGrpSpPr/>
         <p:nvPr/>
       </p:nvGrpSpPr>
@@ -27105,7 +26086,7 @@
       </p:grpSpPr>
       <p:sp>
         <p:nvSpPr>
-          <p:cNvPr id="169" name="Shape 169"/>
+          <p:cNvPr id="220" name="Shape 220"/>
           <p:cNvSpPr txBox="1">
             <a:spLocks noGrp="1"/>
           </p:cNvSpPr>
@@ -27115,8 +26096,276 @@
         </p:nvSpPr>
         <p:spPr>
           <a:xfrm>
-            <a:off x="457199" y="1360318"/>
-            <a:ext cx="7310761" cy="876300"/>
+            <a:off x="419900" y="1289063"/>
+            <a:ext cx="8190600" cy="1143000"/>
+          </a:xfrm>
+          <a:prstGeom prst="rect">
+            <a:avLst/>
+          </a:prstGeom>
+          <a:noFill/>
+          <a:ln>
+            <a:noFill/>
+          </a:ln>
+        </p:spPr>
+        <p:txBody>
+          <a:bodyPr spcFirstLastPara="1" wrap="square" lIns="91425" tIns="45700" rIns="91425" bIns="45700" anchor="ctr" anchorCtr="0">
+            <a:noAutofit/>
+          </a:bodyPr>
+          <a:lstStyle/>
+          <a:p>
+            <a:pPr lvl="0" algn="l"/>
+            <a:r>
+              <a:rPr lang="en-US" sz="4100" b="1" dirty="0" err="1">
+                <a:latin typeface="Roboto"/>
+                <a:ea typeface="Roboto"/>
+                <a:cs typeface="Roboto"/>
+                <a:sym typeface="Roboto"/>
+              </a:rPr>
+              <a:t>Program.cs</a:t>
+            </a:r>
+            <a:endParaRPr sz="4100" b="1" i="0" u="none" strike="noStrike" cap="none" dirty="0">
+              <a:solidFill>
+                <a:schemeClr val="dk1"/>
+              </a:solidFill>
+              <a:latin typeface="Roboto"/>
+              <a:ea typeface="Roboto"/>
+              <a:cs typeface="Roboto"/>
+              <a:sym typeface="Roboto"/>
+            </a:endParaRPr>
+          </a:p>
+        </p:txBody>
+      </p:sp>
+      <p:sp>
+        <p:nvSpPr>
+          <p:cNvPr id="221" name="Shape 221"/>
+          <p:cNvSpPr/>
+          <p:nvPr/>
+        </p:nvSpPr>
+        <p:spPr>
+          <a:xfrm>
+            <a:off x="524675" y="2741687"/>
+            <a:ext cx="365400" cy="365400"/>
+          </a:xfrm>
+          <a:prstGeom prst="rect">
+            <a:avLst/>
+          </a:prstGeom>
+          <a:noFill/>
+          <a:ln w="19050" cap="flat" cmpd="sng">
+            <a:solidFill>
+              <a:srgbClr val="262626"/>
+            </a:solidFill>
+            <a:prstDash val="solid"/>
+            <a:round/>
+            <a:headEnd type="none" w="med" len="med"/>
+            <a:tailEnd type="none" w="med" len="med"/>
+          </a:ln>
+        </p:spPr>
+        <p:txBody>
+          <a:bodyPr spcFirstLastPara="1" wrap="square" lIns="91425" tIns="91425" rIns="91425" bIns="91425" anchor="ctr" anchorCtr="0">
+            <a:noAutofit/>
+          </a:bodyPr>
+          <a:lstStyle/>
+          <a:p>
+            <a:pPr marL="0" lvl="0" indent="0" algn="ctr">
+              <a:spcBef>
+                <a:spcPts val="0"/>
+              </a:spcBef>
+              <a:spcAft>
+                <a:spcPts val="0"/>
+              </a:spcAft>
+              <a:buNone/>
+            </a:pPr>
+            <a:r>
+              <a:rPr lang="en-US" b="1">
+                <a:latin typeface="Roboto"/>
+                <a:ea typeface="Roboto"/>
+                <a:cs typeface="Roboto"/>
+                <a:sym typeface="Roboto"/>
+              </a:rPr>
+              <a:t>1</a:t>
+            </a:r>
+            <a:endParaRPr b="1">
+              <a:latin typeface="Roboto"/>
+              <a:ea typeface="Roboto"/>
+              <a:cs typeface="Roboto"/>
+              <a:sym typeface="Roboto"/>
+            </a:endParaRPr>
+          </a:p>
+        </p:txBody>
+      </p:sp>
+      <p:sp>
+        <p:nvSpPr>
+          <p:cNvPr id="222" name="Shape 222"/>
+          <p:cNvSpPr/>
+          <p:nvPr/>
+        </p:nvSpPr>
+        <p:spPr>
+          <a:xfrm>
+            <a:off x="524675" y="3843548"/>
+            <a:ext cx="365400" cy="365400"/>
+          </a:xfrm>
+          <a:prstGeom prst="rect">
+            <a:avLst/>
+          </a:prstGeom>
+          <a:noFill/>
+          <a:ln w="19050" cap="flat" cmpd="sng">
+            <a:solidFill>
+              <a:srgbClr val="CC0000"/>
+            </a:solidFill>
+            <a:prstDash val="solid"/>
+            <a:round/>
+            <a:headEnd type="none" w="med" len="med"/>
+            <a:tailEnd type="none" w="med" len="med"/>
+          </a:ln>
+        </p:spPr>
+        <p:txBody>
+          <a:bodyPr spcFirstLastPara="1" wrap="square" lIns="91425" tIns="91425" rIns="91425" bIns="91425" anchor="ctr" anchorCtr="0">
+            <a:noAutofit/>
+          </a:bodyPr>
+          <a:lstStyle/>
+          <a:p>
+            <a:pPr marL="0" lvl="0" indent="0" algn="ctr">
+              <a:spcBef>
+                <a:spcPts val="0"/>
+              </a:spcBef>
+              <a:spcAft>
+                <a:spcPts val="0"/>
+              </a:spcAft>
+              <a:buNone/>
+            </a:pPr>
+            <a:r>
+              <a:rPr lang="en-US" b="1">
+                <a:solidFill>
+                  <a:srgbClr val="CC0000"/>
+                </a:solidFill>
+                <a:latin typeface="Roboto"/>
+                <a:ea typeface="Roboto"/>
+                <a:cs typeface="Roboto"/>
+                <a:sym typeface="Roboto"/>
+              </a:rPr>
+              <a:t>2</a:t>
+            </a:r>
+            <a:endParaRPr b="1">
+              <a:solidFill>
+                <a:srgbClr val="CC0000"/>
+              </a:solidFill>
+              <a:latin typeface="Roboto"/>
+              <a:ea typeface="Roboto"/>
+              <a:cs typeface="Roboto"/>
+              <a:sym typeface="Roboto"/>
+            </a:endParaRPr>
+          </a:p>
+        </p:txBody>
+      </p:sp>
+      <p:sp>
+        <p:nvSpPr>
+          <p:cNvPr id="223" name="Shape 223"/>
+          <p:cNvSpPr/>
+          <p:nvPr/>
+        </p:nvSpPr>
+        <p:spPr>
+          <a:xfrm>
+            <a:off x="524675" y="4954079"/>
+            <a:ext cx="365400" cy="365400"/>
+          </a:xfrm>
+          <a:prstGeom prst="rect">
+            <a:avLst/>
+          </a:prstGeom>
+          <a:noFill/>
+          <a:ln w="19050" cap="flat" cmpd="sng">
+            <a:solidFill>
+              <a:srgbClr val="262626"/>
+            </a:solidFill>
+            <a:prstDash val="solid"/>
+            <a:round/>
+            <a:headEnd type="none" w="med" len="med"/>
+            <a:tailEnd type="none" w="med" len="med"/>
+          </a:ln>
+        </p:spPr>
+        <p:txBody>
+          <a:bodyPr spcFirstLastPara="1" wrap="square" lIns="91425" tIns="91425" rIns="91425" bIns="91425" anchor="ctr" anchorCtr="0">
+            <a:noAutofit/>
+          </a:bodyPr>
+          <a:lstStyle/>
+          <a:p>
+            <a:pPr marL="0" lvl="0" indent="0" algn="ctr">
+              <a:spcBef>
+                <a:spcPts val="0"/>
+              </a:spcBef>
+              <a:spcAft>
+                <a:spcPts val="0"/>
+              </a:spcAft>
+              <a:buNone/>
+            </a:pPr>
+            <a:r>
+              <a:rPr lang="en-US" b="1">
+                <a:latin typeface="Roboto"/>
+                <a:ea typeface="Roboto"/>
+                <a:cs typeface="Roboto"/>
+                <a:sym typeface="Roboto"/>
+              </a:rPr>
+              <a:t>3</a:t>
+            </a:r>
+            <a:endParaRPr b="1">
+              <a:latin typeface="Roboto"/>
+              <a:ea typeface="Roboto"/>
+              <a:cs typeface="Roboto"/>
+              <a:sym typeface="Roboto"/>
+            </a:endParaRPr>
+          </a:p>
+        </p:txBody>
+      </p:sp>
+      <p:sp>
+        <p:nvSpPr>
+          <p:cNvPr id="224" name="Shape 224"/>
+          <p:cNvSpPr txBox="1"/>
+          <p:nvPr/>
+        </p:nvSpPr>
+        <p:spPr>
+          <a:xfrm>
+            <a:off x="1165523" y="3522248"/>
+            <a:ext cx="6840900" cy="1008000"/>
+          </a:xfrm>
+          <a:prstGeom prst="rect">
+            <a:avLst/>
+          </a:prstGeom>
+          <a:noFill/>
+          <a:ln>
+            <a:noFill/>
+          </a:ln>
+        </p:spPr>
+        <p:txBody>
+          <a:bodyPr spcFirstLastPara="1" wrap="square" lIns="91425" tIns="45700" rIns="91425" bIns="45700" anchor="ctr" anchorCtr="0">
+            <a:noAutofit/>
+          </a:bodyPr>
+          <a:lstStyle/>
+          <a:p>
+            <a:pPr lvl="0"/>
+            <a:r>
+              <a:rPr lang="ru-RU" sz="2000" dirty="0">
+                <a:solidFill>
+                  <a:schemeClr val="tx1"/>
+                </a:solidFill>
+                <a:latin typeface="Roboto"/>
+                <a:ea typeface="Roboto"/>
+                <a:cs typeface="Roboto"/>
+                <a:sym typeface="Roboto"/>
+              </a:rPr>
+              <a:t>Из метода Main происходит запуск метода CreateWebHostBuilder, который соответвенно создает хост для развертывания веб приложения</a:t>
+            </a:r>
+          </a:p>
+        </p:txBody>
+      </p:sp>
+      <p:sp>
+        <p:nvSpPr>
+          <p:cNvPr id="225" name="Shape 225"/>
+          <p:cNvSpPr txBox="1"/>
+          <p:nvPr/>
+        </p:nvSpPr>
+        <p:spPr>
+          <a:xfrm>
+            <a:off x="1165523" y="4632779"/>
+            <a:ext cx="6840900" cy="1008000"/>
           </a:xfrm>
           <a:prstGeom prst="rect">
             <a:avLst/>
@@ -27140,14 +26389,14 @@
                 <a:spcPts val="0"/>
               </a:spcAft>
               <a:buClr>
-                <a:schemeClr val="dk1"/>
-              </a:buClr>
-              <a:buSzPts val="4400"/>
-              <a:buFont typeface="Calibri"/>
+                <a:srgbClr val="262626"/>
+              </a:buClr>
+              <a:buSzPts val="2000"/>
+              <a:buFont typeface="Arial"/>
               <a:buNone/>
             </a:pPr>
             <a:r>
-              <a:rPr lang="ru-RU" sz="3300" b="1" dirty="0">
+              <a:rPr lang="ru-RU" sz="2000" i="0" u="none" strike="noStrike" cap="none" dirty="0">
                 <a:solidFill>
                   <a:srgbClr val="262626"/>
                 </a:solidFill>
@@ -27156,10 +26405,10 @@
                 <a:cs typeface="Roboto"/>
                 <a:sym typeface="Roboto"/>
               </a:rPr>
-              <a:t>Типы проектов </a:t>
+              <a:t>При создании хоста используется конфигурация из класса </a:t>
             </a:r>
             <a:r>
-              <a:rPr lang="en-US" sz="3300" b="1" dirty="0">
+              <a:rPr lang="en-US" sz="2000" i="0" u="none" strike="noStrike" cap="none" dirty="0">
                 <a:solidFill>
                   <a:srgbClr val="262626"/>
                 </a:solidFill>
@@ -27168,11 +26417,11 @@
                 <a:cs typeface="Roboto"/>
                 <a:sym typeface="Roboto"/>
               </a:rPr>
-              <a:t>.NET Core</a:t>
+              <a:t>Startup</a:t>
             </a:r>
-            <a:endParaRPr sz="3300" b="1" i="0" u="none" strike="noStrike" cap="none" dirty="0">
+            <a:endParaRPr sz="2000" i="0" u="none" strike="noStrike" cap="none" dirty="0">
               <a:solidFill>
-                <a:srgbClr val="262626"/>
+                <a:srgbClr val="A5A5A5"/>
               </a:solidFill>
               <a:latin typeface="Roboto"/>
               <a:ea typeface="Roboto"/>
@@ -27184,7 +26433,108 @@
       </p:sp>
       <p:sp>
         <p:nvSpPr>
-          <p:cNvPr id="175" name="Shape 175"/>
+          <p:cNvPr id="226" name="Shape 226"/>
+          <p:cNvSpPr txBox="1"/>
+          <p:nvPr/>
+        </p:nvSpPr>
+        <p:spPr>
+          <a:xfrm>
+            <a:off x="1165523" y="2418137"/>
+            <a:ext cx="6840900" cy="1012500"/>
+          </a:xfrm>
+          <a:prstGeom prst="rect">
+            <a:avLst/>
+          </a:prstGeom>
+          <a:noFill/>
+          <a:ln>
+            <a:noFill/>
+          </a:ln>
+        </p:spPr>
+        <p:txBody>
+          <a:bodyPr spcFirstLastPara="1" wrap="square" lIns="91425" tIns="45700" rIns="91425" bIns="45700" anchor="ctr" anchorCtr="0">
+            <a:noAutofit/>
+          </a:bodyPr>
+          <a:lstStyle/>
+          <a:p>
+            <a:pPr lvl="0">
+              <a:lnSpc>
+                <a:spcPct val="110000"/>
+              </a:lnSpc>
+              <a:buClr>
+                <a:srgbClr val="F60046"/>
+              </a:buClr>
+              <a:buSzPts val="2000"/>
+            </a:pPr>
+            <a:r>
+              <a:rPr lang="ru-RU" sz="2000" dirty="0">
+                <a:solidFill>
+                  <a:schemeClr val="tx1"/>
+                </a:solidFill>
+                <a:latin typeface="Roboto"/>
+                <a:ea typeface="Roboto"/>
+                <a:cs typeface="Roboto"/>
+                <a:sym typeface="Roboto"/>
+              </a:rPr>
+              <a:t>Запуск веб приложения </a:t>
+            </a:r>
+            <a:r>
+              <a:rPr lang="en-US" sz="2000" dirty="0">
+                <a:solidFill>
+                  <a:schemeClr val="tx1"/>
+                </a:solidFill>
+                <a:latin typeface="Roboto"/>
+                <a:ea typeface="Roboto"/>
+                <a:cs typeface="Roboto"/>
+                <a:sym typeface="Roboto"/>
+              </a:rPr>
+              <a:t>.NET Core </a:t>
+            </a:r>
+            <a:r>
+              <a:rPr lang="ru-RU" sz="2000" dirty="0">
+                <a:solidFill>
+                  <a:schemeClr val="tx1"/>
+                </a:solidFill>
+                <a:latin typeface="Roboto"/>
+                <a:ea typeface="Roboto"/>
+                <a:cs typeface="Roboto"/>
+                <a:sym typeface="Roboto"/>
+              </a:rPr>
+              <a:t>начинается с метода Main</a:t>
+            </a:r>
+          </a:p>
+        </p:txBody>
+      </p:sp>
+      <p:pic>
+        <p:nvPicPr>
+          <p:cNvPr id="227" name="Shape 227"/>
+          <p:cNvPicPr preferRelativeResize="0"/>
+          <p:nvPr/>
+        </p:nvPicPr>
+        <p:blipFill>
+          <a:blip r:embed="rId3">
+            <a:alphaModFix/>
+          </a:blip>
+          <a:stretch>
+            <a:fillRect/>
+          </a:stretch>
+        </p:blipFill>
+        <p:spPr>
+          <a:xfrm>
+            <a:off x="353700" y="302000"/>
+            <a:ext cx="1741800" cy="502875"/>
+          </a:xfrm>
+          <a:prstGeom prst="rect">
+            <a:avLst/>
+          </a:prstGeom>
+          <a:noFill/>
+          <a:ln>
+            <a:noFill/>
+          </a:ln>
+        </p:spPr>
+      </p:pic>
+      <p:sp>
+        <p:nvSpPr>
+          <p:cNvPr id="228" name="Shape 228"/>
           <p:cNvSpPr/>
           <p:nvPr/>
         </p:nvSpPr>
@@ -27247,68 +26597,10 @@
           </a:p>
         </p:txBody>
       </p:sp>
-      <p:pic>
-        <p:nvPicPr>
-          <p:cNvPr id="176" name="Shape 176"/>
-          <p:cNvPicPr preferRelativeResize="0"/>
-          <p:nvPr/>
-        </p:nvPicPr>
-        <p:blipFill>
-          <a:blip r:embed="rId3">
-            <a:alphaModFix/>
-          </a:blip>
-          <a:stretch>
-            <a:fillRect/>
-          </a:stretch>
-        </p:blipFill>
-        <p:spPr>
-          <a:xfrm>
-            <a:off x="353700" y="302000"/>
-            <a:ext cx="1741800" cy="502875"/>
-          </a:xfrm>
-          <a:prstGeom prst="rect">
-            <a:avLst/>
-          </a:prstGeom>
-          <a:noFill/>
-          <a:ln>
-            <a:noFill/>
-          </a:ln>
-        </p:spPr>
-      </p:pic>
-      <p:pic>
-        <p:nvPicPr>
-          <p:cNvPr id="4" name="Picture 3">
-            <a:extLst>
-              <a:ext uri="{FF2B5EF4-FFF2-40B4-BE49-F238E27FC236}">
-                <a16:creationId xmlns:a16="http://schemas.microsoft.com/office/drawing/2014/main" id="{6A2AB87B-CCF7-4474-A497-E3E34EBE630A}"/>
-              </a:ext>
-            </a:extLst>
-          </p:cNvPr>
-          <p:cNvPicPr>
-            <a:picLocks noChangeAspect="1"/>
-          </p:cNvPicPr>
-          <p:nvPr/>
-        </p:nvPicPr>
-        <p:blipFill>
-          <a:blip r:embed="rId4"/>
-          <a:stretch>
-            <a:fillRect/>
-          </a:stretch>
-        </p:blipFill>
-        <p:spPr>
-          <a:xfrm>
-            <a:off x="328612" y="2821990"/>
-            <a:ext cx="8486775" cy="2971800"/>
-          </a:xfrm>
-          <a:prstGeom prst="rect">
-            <a:avLst/>
-          </a:prstGeom>
-        </p:spPr>
-      </p:pic>
     </p:spTree>
     <p:extLst>
       <p:ext uri="{BB962C8B-B14F-4D97-AF65-F5344CB8AC3E}">
-        <p14:creationId xmlns:p14="http://schemas.microsoft.com/office/powerpoint/2010/main" val="3368182789"/>
+        <p14:creationId xmlns:p14="http://schemas.microsoft.com/office/powerpoint/2010/main" val="2523235331"/>
       </p:ext>
     </p:extLst>
   </p:cSld>
@@ -27375,7 +26667,7 @@
                 <a:cs typeface="Roboto"/>
                 <a:sym typeface="Roboto"/>
               </a:rPr>
-              <a:t>Program.cs</a:t>
+              <a:t>Startup.cs</a:t>
             </a:r>
             <a:endParaRPr sz="4100" b="1" i="0" u="none" strike="noStrike" cap="none" dirty="0">
               <a:solidFill>
@@ -27605,8 +26897,36 @@
                 <a:cs typeface="Roboto"/>
                 <a:sym typeface="Roboto"/>
               </a:rPr>
-              <a:t>Из метода Main происходит запуск метода CreateWebHostBuilder, который соответвенно создает хост для развертывания веб приложения</a:t>
+              <a:t>В методе </a:t>
             </a:r>
+            <a:r>
+              <a:rPr lang="en-US" sz="2000" dirty="0" err="1">
+                <a:solidFill>
+                  <a:schemeClr val="tx1"/>
+                </a:solidFill>
+                <a:latin typeface="Roboto"/>
+                <a:ea typeface="Roboto"/>
+              </a:rPr>
+              <a:t>ConfigureServices</a:t>
+            </a:r>
+            <a:r>
+              <a:rPr lang="ru-RU" sz="2000" dirty="0">
+                <a:solidFill>
+                  <a:schemeClr val="tx1"/>
+                </a:solidFill>
+                <a:latin typeface="Roboto"/>
+                <a:ea typeface="Roboto"/>
+              </a:rPr>
+              <a:t> описывается конфигурация сервисов используемых веб приложением.</a:t>
+            </a:r>
+            <a:endParaRPr lang="ru-RU" sz="2000" dirty="0">
+              <a:solidFill>
+                <a:schemeClr val="tx1"/>
+              </a:solidFill>
+              <a:latin typeface="Roboto"/>
+              <a:ea typeface="Roboto"/>
+              <a:sym typeface="Roboto"/>
+            </a:endParaRPr>
           </a:p>
         </p:txBody>
       </p:sp>
@@ -27635,19 +26955,11 @@
           </a:bodyPr>
           <a:lstStyle/>
           <a:p>
-            <a:pPr marL="0" marR="0" lvl="0" indent="0" algn="l" rtl="0">
-              <a:spcBef>
-                <a:spcPts val="0"/>
-              </a:spcBef>
-              <a:spcAft>
-                <a:spcPts val="0"/>
-              </a:spcAft>
+            <a:pPr lvl="0">
               <a:buClr>
                 <a:srgbClr val="262626"/>
               </a:buClr>
               <a:buSzPts val="2000"/>
-              <a:buFont typeface="Arial"/>
-              <a:buNone/>
             </a:pPr>
             <a:r>
               <a:rPr lang="ru-RU" sz="2000" i="0" u="none" strike="noStrike" cap="none" dirty="0">
@@ -27659,7 +26971,7 @@
                 <a:cs typeface="Roboto"/>
                 <a:sym typeface="Roboto"/>
               </a:rPr>
-              <a:t>При создании хоста используется конфигурация из класса </a:t>
+              <a:t>В метода </a:t>
             </a:r>
             <a:r>
               <a:rPr lang="en-US" sz="2000" i="0" u="none" strike="noStrike" cap="none" dirty="0">
@@ -27671,7 +26983,55 @@
                 <a:cs typeface="Roboto"/>
                 <a:sym typeface="Roboto"/>
               </a:rPr>
-              <a:t>Startup</a:t>
+              <a:t>Configure </a:t>
+            </a:r>
+            <a:r>
+              <a:rPr lang="ru-RU" sz="2000" i="0" u="none" strike="noStrike" cap="none" dirty="0">
+                <a:solidFill>
+                  <a:srgbClr val="262626"/>
+                </a:solidFill>
+                <a:latin typeface="Roboto"/>
+                <a:ea typeface="Roboto"/>
+                <a:cs typeface="Roboto"/>
+                <a:sym typeface="Roboto"/>
+              </a:rPr>
+              <a:t>описывается цепь обработки </a:t>
+            </a:r>
+            <a:r>
+              <a:rPr lang="ru-RU" sz="2000" dirty="0">
+                <a:solidFill>
+                  <a:srgbClr val="262626"/>
+                </a:solidFill>
+                <a:latin typeface="Roboto"/>
+                <a:ea typeface="Roboto"/>
+                <a:cs typeface="Roboto"/>
+                <a:sym typeface="Roboto"/>
+              </a:rPr>
+              <a:t>веб </a:t>
+            </a:r>
+            <a:r>
+              <a:rPr lang="en-US" sz="2000" dirty="0">
+                <a:solidFill>
+                  <a:srgbClr val="262626"/>
+                </a:solidFill>
+                <a:latin typeface="Roboto"/>
+                <a:ea typeface="Roboto"/>
+                <a:cs typeface="Roboto"/>
+                <a:sym typeface="Roboto"/>
+              </a:rPr>
+              <a:t> </a:t>
+            </a:r>
+            <a:r>
+              <a:rPr lang="ru-RU" sz="2000" dirty="0">
+                <a:solidFill>
+                  <a:srgbClr val="262626"/>
+                </a:solidFill>
+                <a:latin typeface="Roboto"/>
+                <a:ea typeface="Roboto"/>
+                <a:cs typeface="Roboto"/>
+                <a:sym typeface="Roboto"/>
+              </a:rPr>
+              <a:t>запросов</a:t>
             </a:r>
             <a:endParaRPr sz="2000" i="0" u="none" strike="noStrike" cap="none" dirty="0">
               <a:solidFill>
@@ -27729,7 +27089,7 @@
                 <a:cs typeface="Roboto"/>
                 <a:sym typeface="Roboto"/>
               </a:rPr>
-              <a:t>Запуск веб приложения </a:t>
+              <a:t>В шаблоне </a:t>
             </a:r>
             <a:r>
               <a:rPr lang="en-US" sz="2000" dirty="0">
@@ -27741,7 +27101,7 @@
                 <a:cs typeface="Roboto"/>
                 <a:sym typeface="Roboto"/>
               </a:rPr>
-              <a:t>.NET Core </a:t>
+              <a:t>Empty project</a:t>
             </a:r>
             <a:r>
               <a:rPr lang="ru-RU" sz="2000" dirty="0">
@@ -27753,8 +27113,101 @@
                 <a:cs typeface="Roboto"/>
                 <a:sym typeface="Roboto"/>
               </a:rPr>
-              <a:t>начинается с метода Main</a:t>
+              <a:t> класс </a:t>
             </a:r>
+            <a:r>
+              <a:rPr lang="en-US" sz="2000" dirty="0" err="1">
+                <a:solidFill>
+                  <a:schemeClr val="tx1"/>
+                </a:solidFill>
+                <a:latin typeface="Roboto"/>
+                <a:ea typeface="Roboto"/>
+                <a:cs typeface="Roboto"/>
+                <a:sym typeface="Roboto"/>
+              </a:rPr>
+              <a:t>Startup.cs</a:t>
+            </a:r>
+            <a:r>
+              <a:rPr lang="en-US" sz="2000" dirty="0">
+                <a:solidFill>
+                  <a:schemeClr val="tx1"/>
+                </a:solidFill>
+                <a:latin typeface="Roboto"/>
+                <a:ea typeface="Roboto"/>
+                <a:cs typeface="Roboto"/>
+                <a:sym typeface="Roboto"/>
+              </a:rPr>
+              <a:t> </a:t>
+            </a:r>
+            <a:r>
+              <a:rPr lang="ru-RU" sz="2000" dirty="0">
+                <a:solidFill>
+                  <a:schemeClr val="tx1"/>
+                </a:solidFill>
+                <a:latin typeface="Roboto"/>
+                <a:ea typeface="Roboto"/>
+                <a:cs typeface="Roboto"/>
+                <a:sym typeface="Roboto"/>
+              </a:rPr>
+              <a:t>содержит два метода </a:t>
+            </a:r>
+            <a:r>
+              <a:rPr lang="en-US" sz="2000" dirty="0" err="1">
+                <a:solidFill>
+                  <a:schemeClr val="tx1"/>
+                </a:solidFill>
+                <a:latin typeface="Roboto"/>
+                <a:ea typeface="Roboto"/>
+                <a:cs typeface="Roboto"/>
+                <a:sym typeface="Roboto"/>
+              </a:rPr>
+              <a:t>ConfigureServices</a:t>
+            </a:r>
+            <a:r>
+              <a:rPr lang="en-US" sz="2000" dirty="0">
+                <a:solidFill>
+                  <a:schemeClr val="tx1"/>
+                </a:solidFill>
+                <a:latin typeface="Roboto"/>
+                <a:ea typeface="Roboto"/>
+                <a:cs typeface="Roboto"/>
+                <a:sym typeface="Roboto"/>
+              </a:rPr>
+              <a:t> </a:t>
+            </a:r>
+            <a:r>
+              <a:rPr lang="ru-RU" sz="2000" dirty="0">
+                <a:solidFill>
+                  <a:schemeClr val="tx1"/>
+                </a:solidFill>
+                <a:latin typeface="Roboto"/>
+                <a:ea typeface="Roboto"/>
+                <a:cs typeface="Roboto"/>
+                <a:sym typeface="Roboto"/>
+              </a:rPr>
+              <a:t>и </a:t>
+            </a:r>
+            <a:r>
+              <a:rPr lang="en-US" sz="2000" dirty="0">
+                <a:solidFill>
+                  <a:schemeClr val="tx1"/>
+                </a:solidFill>
+                <a:latin typeface="Roboto"/>
+                <a:ea typeface="Roboto"/>
+                <a:cs typeface="Roboto"/>
+                <a:sym typeface="Roboto"/>
+              </a:rPr>
+              <a:t>Configure</a:t>
+            </a:r>
+            <a:endParaRPr lang="ru-RU" sz="2000" dirty="0">
+              <a:solidFill>
+                <a:schemeClr val="tx1"/>
+              </a:solidFill>
+              <a:latin typeface="Roboto"/>
+              <a:ea typeface="Roboto"/>
+              <a:cs typeface="Roboto"/>
+              <a:sym typeface="Roboto"/>
+            </a:endParaRPr>
           </a:p>
         </p:txBody>
       </p:sp>
@@ -27854,7 +27307,7 @@
     </p:spTree>
     <p:extLst>
       <p:ext uri="{BB962C8B-B14F-4D97-AF65-F5344CB8AC3E}">
-        <p14:creationId xmlns:p14="http://schemas.microsoft.com/office/powerpoint/2010/main" val="2523235331"/>
+        <p14:creationId xmlns:p14="http://schemas.microsoft.com/office/powerpoint/2010/main" val="184029711"/>
       </p:ext>
     </p:extLst>
   </p:cSld>

</xml_diff>